<commit_message>
Add ROS topic communication slide, update the formatting of the Introduction slide
</commit_message>
<xml_diff>
--- a/DiRa_Digital_Race_Software/Reference/ROS/Introduction to ROS.pptx
+++ b/DiRa_Digital_Race_Software/Reference/ROS/Introduction to ROS.pptx
@@ -301,7 +301,7 @@
           <a:p>
             <a:fld id="{1160EA64-D806-43AC-9DF2-F8C432F32B4C}" type="datetimeFigureOut">
               <a:rPr lang="en-US" dirty="0"/>
-              <a:t>6/17/2019</a:t>
+              <a:t>6/20/2019</a:t>
             </a:fld>
             <a:endParaRPr lang="en-US" dirty="0"/>
           </a:p>
@@ -467,7 +467,7 @@
           <a:p>
             <a:fld id="{E9F9C37B-1D36-470B-8223-D6C91242EC14}" type="datetimeFigureOut">
               <a:rPr lang="en-US" dirty="0"/>
-              <a:t>6/17/2019</a:t>
+              <a:t>6/20/2019</a:t>
             </a:fld>
             <a:endParaRPr lang="en-US" dirty="0"/>
           </a:p>
@@ -642,7 +642,7 @@
           <a:p>
             <a:fld id="{67C6F52A-A82B-47A2-A83A-8C4C91F2D59F}" type="datetimeFigureOut">
               <a:rPr lang="en-US" dirty="0"/>
-              <a:t>6/17/2019</a:t>
+              <a:t>6/20/2019</a:t>
             </a:fld>
             <a:endParaRPr lang="en-US" dirty="0"/>
           </a:p>
@@ -807,7 +807,7 @@
           <a:p>
             <a:fld id="{F070A7B3-6521-4DCA-87E5-044747A908C1}" type="datetimeFigureOut">
               <a:rPr lang="en-US" dirty="0"/>
-              <a:t>6/17/2019</a:t>
+              <a:t>6/20/2019</a:t>
             </a:fld>
             <a:endParaRPr lang="en-US" dirty="0"/>
           </a:p>
@@ -1071,7 +1071,7 @@
           <a:p>
             <a:fld id="{1160EA64-D806-43AC-9DF2-F8C432F32B4C}" type="datetimeFigureOut">
               <a:rPr lang="en-US" dirty="0"/>
-              <a:t>6/17/2019</a:t>
+              <a:t>6/20/2019</a:t>
             </a:fld>
             <a:endParaRPr lang="en-US" dirty="0"/>
           </a:p>
@@ -1299,7 +1299,7 @@
           <a:p>
             <a:fld id="{AB134690-1557-4C89-A502-4959FE7FAD70}" type="datetimeFigureOut">
               <a:rPr lang="en-US" dirty="0"/>
-              <a:t>6/17/2019</a:t>
+              <a:t>6/20/2019</a:t>
             </a:fld>
             <a:endParaRPr lang="en-US" dirty="0"/>
           </a:p>
@@ -1653,7 +1653,7 @@
           <a:p>
             <a:fld id="{4F7D4976-E339-4826-83B7-FBD03F55ECF8}" type="datetimeFigureOut">
               <a:rPr lang="en-US" dirty="0"/>
-              <a:t>6/17/2019</a:t>
+              <a:t>6/20/2019</a:t>
             </a:fld>
             <a:endParaRPr lang="en-US" dirty="0"/>
           </a:p>
@@ -1789,7 +1789,7 @@
           <a:p>
             <a:fld id="{E1037C31-9E7A-4F99-8774-A0E530DE1A42}" type="datetimeFigureOut">
               <a:rPr lang="en-US" dirty="0"/>
-              <a:t>6/17/2019</a:t>
+              <a:t>6/20/2019</a:t>
             </a:fld>
             <a:endParaRPr lang="en-US" dirty="0"/>
           </a:p>
@@ -1879,7 +1879,7 @@
           <a:p>
             <a:fld id="{C278504F-A551-4DE0-9316-4DCD1D8CC752}" type="datetimeFigureOut">
               <a:rPr lang="en-US" dirty="0"/>
-              <a:t>6/17/2019</a:t>
+              <a:t>6/20/2019</a:t>
             </a:fld>
             <a:endParaRPr lang="en-US" dirty="0"/>
           </a:p>
@@ -2231,7 +2231,7 @@
           <a:p>
             <a:fld id="{D1BE4249-C0D0-4B06-8692-E8BB871AF643}" type="datetimeFigureOut">
               <a:rPr lang="en-US" dirty="0"/>
-              <a:t>6/17/2019</a:t>
+              <a:t>6/20/2019</a:t>
             </a:fld>
             <a:endParaRPr lang="en-US" dirty="0"/>
           </a:p>
@@ -2583,7 +2583,7 @@
           <a:p>
             <a:fld id="{042B0DB6-F5C7-45FB-8CF3-31B45F9C2DAC}" type="datetimeFigureOut">
               <a:rPr lang="en-US" dirty="0"/>
-              <a:t>6/17/2019</a:t>
+              <a:t>6/20/2019</a:t>
             </a:fld>
             <a:endParaRPr lang="en-US" dirty="0"/>
           </a:p>
@@ -2819,7 +2819,7 @@
           <a:p>
             <a:fld id="{1160EA64-D806-43AC-9DF2-F8C432F32B4C}" type="datetimeFigureOut">
               <a:rPr lang="en-US" dirty="0"/>
-              <a:t>6/17/2019</a:t>
+              <a:t>6/20/2019</a:t>
             </a:fld>
             <a:endParaRPr lang="en-US" dirty="0"/>
           </a:p>
@@ -3296,31 +3296,6 @@
           </a:p>
         </p:txBody>
       </p:sp>
-      <p:sp>
-        <p:nvSpPr>
-          <p:cNvPr id="3" name="Subtitle 2">
-            <a:extLst>
-              <a:ext uri="{FF2B5EF4-FFF2-40B4-BE49-F238E27FC236}">
-                <a16:creationId xmlns:a16="http://schemas.microsoft.com/office/drawing/2014/main" id="{C6F064D9-D409-49E6-B987-8CDFF61ECA0F}"/>
-              </a:ext>
-            </a:extLst>
-          </p:cNvPr>
-          <p:cNvSpPr>
-            <a:spLocks noGrp="1"/>
-          </p:cNvSpPr>
-          <p:nvPr>
-            <p:ph type="subTitle" idx="1"/>
-          </p:nvPr>
-        </p:nvSpPr>
-        <p:spPr/>
-        <p:txBody>
-          <a:bodyPr/>
-          <a:lstStyle/>
-          <a:p>
-            <a:endParaRPr lang="en-US" dirty="0"/>
-          </a:p>
-        </p:txBody>
-      </p:sp>
     </p:spTree>
     <p:extLst>
       <p:ext uri="{BB962C8B-B14F-4D97-AF65-F5344CB8AC3E}">
@@ -4952,140 +4927,162 @@
           <a:lstStyle/>
           <a:p>
             <a:r>
-              <a:rPr lang="en-US" i="1" dirty="0" err="1"/>
-              <a:t>catkin</a:t>
+              <a:rPr lang="en-US" dirty="0">
+                <a:latin typeface="Courier New" panose="02070309020205020404" pitchFamily="49" charset="0"/>
+                <a:cs typeface="Courier New" panose="02070309020205020404" pitchFamily="49" charset="0"/>
+              </a:rPr>
+              <a:t>catkin_create_pkg &lt;package_name&gt; &lt;depend1&gt; &lt;depend2&gt; …: </a:t>
+            </a:r>
+            <a:br>
+              <a:rPr lang="en-US" dirty="0"/>
+            </a:br>
+            <a:r>
+              <a:rPr lang="en-US" dirty="0"/>
+              <a:t>Create a new package at the current directory with all mentioned </a:t>
             </a:r>
             <a:r>
               <a:rPr lang="en-US" dirty="0" err="1"/>
-              <a:t>_</a:t>
-            </a:r>
-            <a:r>
-              <a:rPr lang="en-US" i="1" dirty="0" err="1"/>
-              <a:t>create</a:t>
-            </a:r>
-            <a:r>
-              <a:rPr lang="en-US" dirty="0" err="1"/>
-              <a:t>_</a:t>
-            </a:r>
-            <a:r>
-              <a:rPr lang="en-US" i="1" dirty="0" err="1"/>
-              <a:t>pkg</a:t>
+              <a:t>dependecies</a:t>
+            </a:r>
+            <a:endParaRPr lang="en-US" dirty="0"/>
+          </a:p>
+          <a:p>
+            <a:r>
+              <a:rPr lang="en-US" dirty="0" err="1">
+                <a:latin typeface="Courier New" panose="02070309020205020404" pitchFamily="49" charset="0"/>
+                <a:cs typeface="Courier New" panose="02070309020205020404" pitchFamily="49" charset="0"/>
+              </a:rPr>
+              <a:t>catkin_make</a:t>
+            </a:r>
+            <a:r>
+              <a:rPr lang="en-US" dirty="0">
+                <a:latin typeface="Courier New" panose="02070309020205020404" pitchFamily="49" charset="0"/>
+                <a:cs typeface="Courier New" panose="02070309020205020404" pitchFamily="49" charset="0"/>
+              </a:rPr>
+              <a:t>: </a:t>
+            </a:r>
+            <a:r>
+              <a:rPr lang="en-US" dirty="0"/>
+              <a:t>build the whole package in the workspace</a:t>
+            </a:r>
+          </a:p>
+          <a:p>
+            <a:r>
+              <a:rPr lang="en-US" dirty="0" err="1">
+                <a:latin typeface="Courier New" panose="02070309020205020404" pitchFamily="49" charset="0"/>
+                <a:cs typeface="Courier New" panose="02070309020205020404" pitchFamily="49" charset="0"/>
+              </a:rPr>
+              <a:t>rospack</a:t>
+            </a:r>
+            <a:r>
+              <a:rPr lang="en-US" dirty="0">
+                <a:latin typeface="Courier New" panose="02070309020205020404" pitchFamily="49" charset="0"/>
+                <a:cs typeface="Courier New" panose="02070309020205020404" pitchFamily="49" charset="0"/>
+              </a:rPr>
+              <a:t>: </a:t>
+            </a:r>
+            <a:r>
+              <a:rPr lang="en-US" dirty="0"/>
+              <a:t>get information about the ROS package</a:t>
+            </a:r>
+          </a:p>
+          <a:p>
+            <a:r>
+              <a:rPr lang="en-US" dirty="0" err="1">
+                <a:latin typeface="Courier New" panose="02070309020205020404" pitchFamily="49" charset="0"/>
+                <a:cs typeface="Courier New" panose="02070309020205020404" pitchFamily="49" charset="0"/>
+              </a:rPr>
+              <a:t>rosdep</a:t>
+            </a:r>
+            <a:r>
+              <a:rPr lang="en-US" dirty="0">
+                <a:latin typeface="Courier New" panose="02070309020205020404" pitchFamily="49" charset="0"/>
+                <a:cs typeface="Courier New" panose="02070309020205020404" pitchFamily="49" charset="0"/>
+              </a:rPr>
+              <a:t>: </a:t>
+            </a:r>
+            <a:r>
+              <a:rPr lang="en-US" dirty="0"/>
+              <a:t>install all dependency for the package</a:t>
+            </a:r>
+          </a:p>
+          <a:p>
+            <a:r>
+              <a:rPr lang="en-US" dirty="0" err="1">
+                <a:latin typeface="Courier New" panose="02070309020205020404" pitchFamily="49" charset="0"/>
+                <a:cs typeface="Courier New" panose="02070309020205020404" pitchFamily="49" charset="0"/>
+              </a:rPr>
+              <a:t>roscd</a:t>
+            </a:r>
+            <a:r>
+              <a:rPr lang="en-US" dirty="0">
+                <a:latin typeface="Courier New" panose="02070309020205020404" pitchFamily="49" charset="0"/>
+                <a:cs typeface="Courier New" panose="02070309020205020404" pitchFamily="49" charset="0"/>
+              </a:rPr>
+              <a:t>: </a:t>
+            </a:r>
+            <a:r>
+              <a:rPr lang="en-US" dirty="0"/>
+              <a:t>change directory using a package name (work similar to regular cd)</a:t>
+            </a:r>
+          </a:p>
+          <a:p>
+            <a:r>
+              <a:rPr lang="en-US" dirty="0" err="1">
+                <a:latin typeface="Courier New" panose="02070309020205020404" pitchFamily="49" charset="0"/>
+                <a:cs typeface="Courier New" panose="02070309020205020404" pitchFamily="49" charset="0"/>
+              </a:rPr>
+              <a:t>roscp</a:t>
+            </a:r>
+            <a:r>
+              <a:rPr lang="en-US" dirty="0">
+                <a:latin typeface="Courier New" panose="02070309020205020404" pitchFamily="49" charset="0"/>
+                <a:cs typeface="Courier New" panose="02070309020205020404" pitchFamily="49" charset="0"/>
+              </a:rPr>
+              <a:t>: </a:t>
+            </a:r>
+            <a:r>
+              <a:rPr lang="en-US" dirty="0"/>
+              <a:t>copy a file from a package</a:t>
+            </a:r>
+          </a:p>
+          <a:p>
+            <a:r>
+              <a:rPr lang="en-US" dirty="0" err="1">
+                <a:latin typeface="Courier New" panose="02070309020205020404" pitchFamily="49" charset="0"/>
+                <a:cs typeface="Courier New" panose="02070309020205020404" pitchFamily="49" charset="0"/>
+              </a:rPr>
+              <a:t>rosed</a:t>
+            </a:r>
+            <a:r>
+              <a:rPr lang="en-US" dirty="0">
+                <a:latin typeface="Courier New" panose="02070309020205020404" pitchFamily="49" charset="0"/>
+                <a:cs typeface="Courier New" panose="02070309020205020404" pitchFamily="49" charset="0"/>
+              </a:rPr>
+              <a:t>: </a:t>
+            </a:r>
+            <a:r>
+              <a:rPr lang="en-US" dirty="0"/>
+              <a:t>edit a file (default editor is vim, can be changed)</a:t>
             </a:r>
             <a:r>
               <a:rPr lang="en-US" i="1" dirty="0"/>
               <a:t> </a:t>
             </a:r>
-            <a:r>
-              <a:rPr lang="en-US" dirty="0"/>
-              <a:t>&lt;</a:t>
-            </a:r>
-            <a:r>
-              <a:rPr lang="en-US" dirty="0" err="1"/>
-              <a:t>package_name</a:t>
-            </a:r>
-            <a:r>
-              <a:rPr lang="en-US" dirty="0"/>
-              <a:t>&gt; &lt;depend1&gt; &lt;depend2&gt; …: </a:t>
-            </a:r>
-            <a:br>
-              <a:rPr lang="en-US" dirty="0"/>
-            </a:br>
-            <a:r>
-              <a:rPr lang="en-US" dirty="0"/>
-              <a:t>Create a new package at the current directory</a:t>
-            </a:r>
-          </a:p>
-          <a:p>
-            <a:r>
-              <a:rPr lang="en-US" i="1" dirty="0" err="1"/>
-              <a:t>catkin_make</a:t>
-            </a:r>
-            <a:r>
-              <a:rPr lang="en-US" i="1" dirty="0"/>
-              <a:t>:</a:t>
-            </a:r>
-            <a:r>
-              <a:rPr lang="en-US" dirty="0"/>
-              <a:t> build the whole package in the workspace</a:t>
-            </a:r>
-          </a:p>
-          <a:p>
-            <a:r>
-              <a:rPr lang="en-US" i="1" dirty="0" err="1"/>
-              <a:t>rospack</a:t>
-            </a:r>
-            <a:r>
-              <a:rPr lang="en-US" i="1" dirty="0"/>
-              <a:t>: </a:t>
-            </a:r>
-            <a:r>
-              <a:rPr lang="en-US" dirty="0"/>
-              <a:t>get information about the ROS package</a:t>
-            </a:r>
-          </a:p>
-          <a:p>
-            <a:r>
-              <a:rPr lang="en-US" i="1" dirty="0" err="1"/>
-              <a:t>rosdep</a:t>
-            </a:r>
-            <a:r>
-              <a:rPr lang="en-US" dirty="0"/>
-              <a:t>: install all dependency for the package</a:t>
-            </a:r>
-          </a:p>
-          <a:p>
-            <a:r>
-              <a:rPr lang="en-US" i="1" dirty="0" err="1"/>
-              <a:t>roscd</a:t>
-            </a:r>
-            <a:r>
-              <a:rPr lang="en-US" i="1" dirty="0"/>
-              <a:t>: </a:t>
-            </a:r>
-            <a:r>
-              <a:rPr lang="en-US" dirty="0"/>
-              <a:t>change directory using a package name (work similar to regular cd)</a:t>
-            </a:r>
-          </a:p>
-          <a:p>
-            <a:r>
-              <a:rPr lang="en-US" i="1" dirty="0" err="1"/>
-              <a:t>roscp</a:t>
-            </a:r>
-            <a:r>
-              <a:rPr lang="en-US" i="1" dirty="0"/>
-              <a:t>: </a:t>
-            </a:r>
-            <a:r>
-              <a:rPr lang="en-US" dirty="0"/>
-              <a:t>copy a file from a package</a:t>
-            </a:r>
-          </a:p>
-          <a:p>
-            <a:r>
-              <a:rPr lang="en-US" i="1" dirty="0" err="1"/>
-              <a:t>rosed</a:t>
-            </a:r>
-            <a:r>
-              <a:rPr lang="en-US" i="1" dirty="0"/>
-              <a:t>: </a:t>
-            </a:r>
-            <a:r>
-              <a:rPr lang="en-US" dirty="0"/>
-              <a:t>edit a file (default editor is vim, can be changed)</a:t>
-            </a:r>
-            <a:r>
-              <a:rPr lang="en-US" i="1" dirty="0"/>
-              <a:t> </a:t>
-            </a:r>
-          </a:p>
-          <a:p>
-            <a:r>
-              <a:rPr lang="en-US" i="1" dirty="0" err="1"/>
+          </a:p>
+          <a:p>
+            <a:r>
+              <a:rPr lang="en-US" dirty="0" err="1">
+                <a:latin typeface="Courier New" panose="02070309020205020404" pitchFamily="49" charset="0"/>
+                <a:cs typeface="Courier New" panose="02070309020205020404" pitchFamily="49" charset="0"/>
+              </a:rPr>
               <a:t>rosrun</a:t>
             </a:r>
             <a:r>
-              <a:rPr lang="en-US" i="1" dirty="0"/>
+              <a:rPr lang="en-US" dirty="0">
+                <a:latin typeface="Courier New" panose="02070309020205020404" pitchFamily="49" charset="0"/>
+                <a:cs typeface="Courier New" panose="02070309020205020404" pitchFamily="49" charset="0"/>
+              </a:rPr>
               <a:t>: </a:t>
             </a:r>
             <a:r>
@@ -5276,12 +5273,22 @@
           <a:lstStyle/>
           <a:p>
             <a:r>
-              <a:rPr lang="en-US" i="1" dirty="0" err="1"/>
+              <a:rPr lang="en-US" sz="1700" dirty="0" err="1">
+                <a:latin typeface="Courier New" panose="02070309020205020404" pitchFamily="49" charset="0"/>
+                <a:cs typeface="Courier New" panose="02070309020205020404" pitchFamily="49" charset="0"/>
+              </a:rPr>
               <a:t>roscore</a:t>
             </a:r>
             <a:r>
-              <a:rPr lang="en-US" dirty="0"/>
-              <a:t>: starts the ROS master, ROS parameter server and </a:t>
+              <a:rPr lang="en-US" sz="1700" dirty="0">
+                <a:latin typeface="Courier New" panose="02070309020205020404" pitchFamily="49" charset="0"/>
+                <a:cs typeface="Courier New" panose="02070309020205020404" pitchFamily="49" charset="0"/>
+              </a:rPr>
+              <a:t>:</a:t>
+            </a:r>
+            <a:r>
+              <a:rPr lang="en-US" dirty="0"/>
+              <a:t> starts the ROS master, ROS parameter server and </a:t>
             </a:r>
             <a:r>
               <a:rPr lang="en-US" dirty="0" err="1"/>
@@ -5303,7 +5310,11 @@
           <a:p>
             <a:r>
               <a:rPr lang="en-US" dirty="0"/>
-              <a:t>This command is needed before running any of the ROS nodes</a:t>
+              <a:t>This command is needed </a:t>
+            </a:r>
+            <a:r>
+              <a:rPr lang="en-US" b="1" u="sng" dirty="0"/>
+              <a:t>before running any of the ROS nodes</a:t>
             </a:r>
           </a:p>
         </p:txBody>
@@ -5396,111 +5407,169 @@
           <a:lstStyle/>
           <a:p>
             <a:r>
-              <a:rPr lang="en-US" i="1" dirty="0" err="1"/>
+              <a:rPr lang="en-US" sz="1700" dirty="0" err="1">
+                <a:latin typeface="Courier New" panose="02070309020205020404" pitchFamily="49" charset="0"/>
+                <a:cs typeface="Courier New" panose="02070309020205020404" pitchFamily="49" charset="0"/>
+              </a:rPr>
               <a:t>rosnode</a:t>
             </a:r>
             <a:r>
+              <a:rPr lang="en-US" sz="1700" dirty="0">
+                <a:latin typeface="Courier New" panose="02070309020205020404" pitchFamily="49" charset="0"/>
+                <a:cs typeface="Courier New" panose="02070309020205020404" pitchFamily="49" charset="0"/>
+              </a:rPr>
+              <a:t> info &lt;</a:t>
+            </a:r>
+            <a:r>
+              <a:rPr lang="en-US" sz="1700" dirty="0" err="1">
+                <a:latin typeface="Courier New" panose="02070309020205020404" pitchFamily="49" charset="0"/>
+                <a:cs typeface="Courier New" panose="02070309020205020404" pitchFamily="49" charset="0"/>
+              </a:rPr>
+              <a:t>node_name</a:t>
+            </a:r>
+            <a:r>
+              <a:rPr lang="en-US" sz="1700" dirty="0">
+                <a:latin typeface="Courier New" panose="02070309020205020404" pitchFamily="49" charset="0"/>
+                <a:cs typeface="Courier New" panose="02070309020205020404" pitchFamily="49" charset="0"/>
+              </a:rPr>
+              <a:t>&gt;: </a:t>
+            </a:r>
+            <a:r>
+              <a:rPr lang="en-US" dirty="0"/>
+              <a:t>get information about the node</a:t>
+            </a:r>
+            <a:endParaRPr lang="en-US" i="1" dirty="0"/>
+          </a:p>
+          <a:p>
+            <a:r>
+              <a:rPr lang="en-US" sz="1700" dirty="0" err="1">
+                <a:latin typeface="Courier New" panose="02070309020205020404" pitchFamily="49" charset="0"/>
+                <a:cs typeface="Courier New" panose="02070309020205020404" pitchFamily="49" charset="0"/>
+              </a:rPr>
+              <a:t>rosnode</a:t>
+            </a:r>
+            <a:r>
+              <a:rPr lang="en-US" sz="1700" dirty="0">
+                <a:latin typeface="Courier New" panose="02070309020205020404" pitchFamily="49" charset="0"/>
+                <a:cs typeface="Courier New" panose="02070309020205020404" pitchFamily="49" charset="0"/>
+              </a:rPr>
+              <a:t> kill &lt;</a:t>
+            </a:r>
+            <a:r>
+              <a:rPr lang="en-US" sz="1700" dirty="0" err="1">
+                <a:latin typeface="Courier New" panose="02070309020205020404" pitchFamily="49" charset="0"/>
+                <a:cs typeface="Courier New" panose="02070309020205020404" pitchFamily="49" charset="0"/>
+              </a:rPr>
+              <a:t>node_name</a:t>
+            </a:r>
+            <a:r>
+              <a:rPr lang="en-US" sz="1700" dirty="0">
+                <a:latin typeface="Courier New" panose="02070309020205020404" pitchFamily="49" charset="0"/>
+                <a:cs typeface="Courier New" panose="02070309020205020404" pitchFamily="49" charset="0"/>
+              </a:rPr>
+              <a:t>&gt;: </a:t>
+            </a:r>
+            <a:r>
+              <a:rPr lang="en-US" dirty="0"/>
+              <a:t>kill the running node</a:t>
+            </a:r>
+            <a:endParaRPr lang="en-US" i="1" dirty="0"/>
+          </a:p>
+          <a:p>
+            <a:r>
+              <a:rPr lang="en-US" sz="1700" dirty="0" err="1">
+                <a:latin typeface="Courier New" panose="02070309020205020404" pitchFamily="49" charset="0"/>
+                <a:cs typeface="Courier New" panose="02070309020205020404" pitchFamily="49" charset="0"/>
+              </a:rPr>
+              <a:t>rosnode</a:t>
+            </a:r>
+            <a:r>
+              <a:rPr lang="en-US" sz="1700" dirty="0">
+                <a:latin typeface="Courier New" panose="02070309020205020404" pitchFamily="49" charset="0"/>
+                <a:cs typeface="Courier New" panose="02070309020205020404" pitchFamily="49" charset="0"/>
+              </a:rPr>
+              <a:t> list:  </a:t>
+            </a:r>
+            <a:r>
+              <a:rPr lang="en-US" dirty="0"/>
+              <a:t>list all nodes</a:t>
+            </a:r>
+            <a:endParaRPr lang="en-US" i="1" dirty="0"/>
+          </a:p>
+          <a:p>
+            <a:r>
+              <a:rPr lang="en-US" sz="1700" dirty="0" err="1">
+                <a:latin typeface="Courier New" panose="02070309020205020404" pitchFamily="49" charset="0"/>
+                <a:cs typeface="Courier New" panose="02070309020205020404" pitchFamily="49" charset="0"/>
+              </a:rPr>
+              <a:t>rosnode</a:t>
+            </a:r>
+            <a:r>
+              <a:rPr lang="en-US" sz="1700" dirty="0">
+                <a:latin typeface="Courier New" panose="02070309020205020404" pitchFamily="49" charset="0"/>
+                <a:cs typeface="Courier New" panose="02070309020205020404" pitchFamily="49" charset="0"/>
+              </a:rPr>
+              <a:t> machine &lt;</a:t>
+            </a:r>
+            <a:r>
+              <a:rPr lang="en-US" sz="1700" dirty="0" err="1">
+                <a:latin typeface="Courier New" panose="02070309020205020404" pitchFamily="49" charset="0"/>
+                <a:cs typeface="Courier New" panose="02070309020205020404" pitchFamily="49" charset="0"/>
+              </a:rPr>
+              <a:t>machine_name</a:t>
+            </a:r>
+            <a:r>
+              <a:rPr lang="en-US" sz="1700" dirty="0">
+                <a:latin typeface="Courier New" panose="02070309020205020404" pitchFamily="49" charset="0"/>
+                <a:cs typeface="Courier New" panose="02070309020205020404" pitchFamily="49" charset="0"/>
+              </a:rPr>
+              <a:t>&gt;: </a:t>
+            </a:r>
+            <a:r>
+              <a:rPr lang="en-US" dirty="0"/>
+              <a:t>list the nodes running on a particular machine</a:t>
+            </a:r>
+            <a:endParaRPr lang="en-US" i="1" dirty="0"/>
+          </a:p>
+          <a:p>
+            <a:r>
+              <a:rPr lang="en-US" sz="1700" dirty="0" err="1">
+                <a:latin typeface="Courier New" panose="02070309020205020404" pitchFamily="49" charset="0"/>
+                <a:cs typeface="Courier New" panose="02070309020205020404" pitchFamily="49" charset="0"/>
+              </a:rPr>
+              <a:t>rosnode</a:t>
+            </a:r>
+            <a:r>
+              <a:rPr lang="en-US" sz="1700" dirty="0">
+                <a:latin typeface="Courier New" panose="02070309020205020404" pitchFamily="49" charset="0"/>
+                <a:cs typeface="Courier New" panose="02070309020205020404" pitchFamily="49" charset="0"/>
+              </a:rPr>
+              <a:t> ping: </a:t>
+            </a:r>
+            <a:r>
+              <a:rPr lang="en-US" dirty="0"/>
+              <a:t>check connectivity to a node</a:t>
+            </a:r>
+            <a:endParaRPr lang="en-US" i="1" dirty="0"/>
+          </a:p>
+          <a:p>
+            <a:r>
+              <a:rPr lang="en-US" sz="1700" dirty="0" err="1">
+                <a:latin typeface="Courier New" panose="02070309020205020404" pitchFamily="49" charset="0"/>
+                <a:cs typeface="Courier New" panose="02070309020205020404" pitchFamily="49" charset="0"/>
+              </a:rPr>
+              <a:t>rosnode</a:t>
+            </a:r>
+            <a:r>
+              <a:rPr lang="en-US" sz="1700" dirty="0">
+                <a:latin typeface="Courier New" panose="02070309020205020404" pitchFamily="49" charset="0"/>
+                <a:cs typeface="Courier New" panose="02070309020205020404" pitchFamily="49" charset="0"/>
+              </a:rPr>
+              <a:t> </a:t>
+            </a:r>
+            <a:r>
               <a:rPr lang="en-US" i="1" dirty="0"/>
-              <a:t> info &lt;</a:t>
-            </a:r>
-            <a:r>
-              <a:rPr lang="en-US" i="1" dirty="0" err="1"/>
-              <a:t>node_name</a:t>
-            </a:r>
-            <a:r>
-              <a:rPr lang="en-US" i="1" dirty="0"/>
-              <a:t>&gt;: </a:t>
-            </a:r>
-            <a:r>
-              <a:rPr lang="en-US" dirty="0"/>
-              <a:t>get information about the node</a:t>
-            </a:r>
-            <a:endParaRPr lang="en-US" i="1" dirty="0"/>
-          </a:p>
-          <a:p>
-            <a:r>
-              <a:rPr lang="en-US" i="1" dirty="0" err="1"/>
-              <a:t>rosnode</a:t>
-            </a:r>
-            <a:r>
-              <a:rPr lang="en-US" i="1" dirty="0"/>
-              <a:t> kill &lt;</a:t>
-            </a:r>
-            <a:r>
-              <a:rPr lang="en-US" i="1" dirty="0" err="1"/>
-              <a:t>node_name</a:t>
-            </a:r>
-            <a:r>
-              <a:rPr lang="en-US" i="1" dirty="0"/>
-              <a:t>&gt;: </a:t>
-            </a:r>
-            <a:r>
-              <a:rPr lang="en-US" dirty="0"/>
-              <a:t>kill the running node</a:t>
-            </a:r>
-            <a:endParaRPr lang="en-US" i="1" dirty="0"/>
-          </a:p>
-          <a:p>
-            <a:r>
-              <a:rPr lang="en-US" i="1" dirty="0" err="1"/>
-              <a:t>rosnode</a:t>
-            </a:r>
-            <a:r>
-              <a:rPr lang="en-US" i="1" dirty="0"/>
-              <a:t> list: </a:t>
-            </a:r>
-            <a:r>
-              <a:rPr lang="en-US" dirty="0"/>
-              <a:t> list all nodes</a:t>
-            </a:r>
-            <a:endParaRPr lang="en-US" i="1" dirty="0"/>
-          </a:p>
-          <a:p>
-            <a:r>
-              <a:rPr lang="en-US" i="1" dirty="0" err="1"/>
-              <a:t>rosnode</a:t>
-            </a:r>
-            <a:r>
-              <a:rPr lang="en-US" i="1" dirty="0"/>
-              <a:t> machine &lt;</a:t>
-            </a:r>
-            <a:r>
-              <a:rPr lang="en-US" i="1" dirty="0" err="1"/>
-              <a:t>machine_name</a:t>
-            </a:r>
-            <a:r>
-              <a:rPr lang="en-US" i="1" dirty="0"/>
-              <a:t>&gt;:</a:t>
-            </a:r>
-            <a:r>
-              <a:rPr lang="en-US" dirty="0"/>
-              <a:t> list the nodes running on a particular machine</a:t>
-            </a:r>
-            <a:endParaRPr lang="en-US" i="1" dirty="0"/>
-          </a:p>
-          <a:p>
-            <a:r>
-              <a:rPr lang="en-US" i="1" dirty="0" err="1"/>
-              <a:t>rosnode</a:t>
-            </a:r>
-            <a:r>
-              <a:rPr lang="en-US" i="1" dirty="0"/>
-              <a:t> ping: </a:t>
-            </a:r>
-            <a:r>
-              <a:rPr lang="en-US" dirty="0"/>
-              <a:t>check connectivity to a node</a:t>
-            </a:r>
-            <a:endParaRPr lang="en-US" i="1" dirty="0"/>
-          </a:p>
-          <a:p>
-            <a:r>
-              <a:rPr lang="en-US" i="1" dirty="0" err="1"/>
-              <a:t>rosnode</a:t>
-            </a:r>
-            <a:r>
-              <a:rPr lang="en-US" i="1" dirty="0"/>
-              <a:t> cleanup: </a:t>
+              <a:t>cleanup: </a:t>
             </a:r>
             <a:r>
               <a:rPr lang="en-US" dirty="0"/>
@@ -5598,72 +5667,106 @@
           <a:lstStyle/>
           <a:p>
             <a:r>
-              <a:rPr lang="en-US" i="1" dirty="0" err="1"/>
+              <a:rPr lang="en-US" sz="1700" dirty="0" err="1">
+                <a:latin typeface="Courier New" panose="02070309020205020404" pitchFamily="49" charset="0"/>
+                <a:cs typeface="Courier New" panose="02070309020205020404" pitchFamily="49" charset="0"/>
+              </a:rPr>
               <a:t>rosmsg</a:t>
             </a:r>
             <a:r>
+              <a:rPr lang="en-US" sz="1700" dirty="0">
+                <a:latin typeface="Courier New" panose="02070309020205020404" pitchFamily="49" charset="0"/>
+                <a:cs typeface="Courier New" panose="02070309020205020404" pitchFamily="49" charset="0"/>
+              </a:rPr>
+              <a:t> show &lt;message&gt;: </a:t>
+            </a:r>
+            <a:r>
+              <a:rPr lang="en-US" dirty="0"/>
+              <a:t>show the message description</a:t>
+            </a:r>
+            <a:endParaRPr lang="en-US" i="1" dirty="0"/>
+          </a:p>
+          <a:p>
+            <a:r>
+              <a:rPr lang="en-US" sz="1700" dirty="0" err="1">
+                <a:latin typeface="Courier New" panose="02070309020205020404" pitchFamily="49" charset="0"/>
+                <a:cs typeface="Courier New" panose="02070309020205020404" pitchFamily="49" charset="0"/>
+              </a:rPr>
+              <a:t>rosmsg</a:t>
+            </a:r>
+            <a:r>
+              <a:rPr lang="en-US" sz="1700" dirty="0">
+                <a:latin typeface="Courier New" panose="02070309020205020404" pitchFamily="49" charset="0"/>
+                <a:cs typeface="Courier New" panose="02070309020205020404" pitchFamily="49" charset="0"/>
+              </a:rPr>
+              <a:t> list: </a:t>
+            </a:r>
+            <a:r>
+              <a:rPr lang="en-US" dirty="0"/>
+              <a:t>list all messages</a:t>
+            </a:r>
+            <a:endParaRPr lang="en-US" i="1" dirty="0"/>
+          </a:p>
+          <a:p>
+            <a:r>
+              <a:rPr lang="en-US" sz="1700" dirty="0" err="1">
+                <a:latin typeface="Courier New" panose="02070309020205020404" pitchFamily="49" charset="0"/>
+                <a:cs typeface="Courier New" panose="02070309020205020404" pitchFamily="49" charset="0"/>
+              </a:rPr>
+              <a:t>rosmsg</a:t>
+            </a:r>
+            <a:r>
+              <a:rPr lang="en-US" sz="1700" dirty="0">
+                <a:latin typeface="Courier New" panose="02070309020205020404" pitchFamily="49" charset="0"/>
+                <a:cs typeface="Courier New" panose="02070309020205020404" pitchFamily="49" charset="0"/>
+              </a:rPr>
+              <a:t> md5: </a:t>
+            </a:r>
+            <a:r>
+              <a:rPr lang="en-US" dirty="0"/>
+              <a:t>displays md5sum of a message (checksum to confirm the pub/sub are exchanging the same data type)</a:t>
+            </a:r>
+            <a:endParaRPr lang="en-US" i="1" dirty="0"/>
+          </a:p>
+          <a:p>
+            <a:r>
+              <a:rPr lang="en-US" sz="1700" dirty="0" err="1">
+                <a:latin typeface="Courier New" panose="02070309020205020404" pitchFamily="49" charset="0"/>
+                <a:cs typeface="Courier New" panose="02070309020205020404" pitchFamily="49" charset="0"/>
+              </a:rPr>
+              <a:t>rosmsg</a:t>
+            </a:r>
+            <a:r>
+              <a:rPr lang="en-US" sz="1700" dirty="0">
+                <a:latin typeface="Courier New" panose="02070309020205020404" pitchFamily="49" charset="0"/>
+                <a:cs typeface="Courier New" panose="02070309020205020404" pitchFamily="49" charset="0"/>
+              </a:rPr>
+              <a:t> package: </a:t>
+            </a:r>
+            <a:r>
+              <a:rPr lang="en-US" dirty="0"/>
+              <a:t>list the messages in a package</a:t>
+            </a:r>
+            <a:endParaRPr lang="en-US" i="1" dirty="0"/>
+          </a:p>
+          <a:p>
+            <a:r>
+              <a:rPr lang="en-US" sz="1700" dirty="0" err="1">
+                <a:latin typeface="Courier New" panose="02070309020205020404" pitchFamily="49" charset="0"/>
+                <a:cs typeface="Courier New" panose="02070309020205020404" pitchFamily="49" charset="0"/>
+              </a:rPr>
+              <a:t>rosmsg</a:t>
+            </a:r>
+            <a:r>
+              <a:rPr lang="en-US" sz="1700" dirty="0">
+                <a:latin typeface="Courier New" panose="02070309020205020404" pitchFamily="49" charset="0"/>
+                <a:cs typeface="Courier New" panose="02070309020205020404" pitchFamily="49" charset="0"/>
+              </a:rPr>
+              <a:t> packages &lt;package_1&gt; &lt;package_2&gt;</a:t>
+            </a:r>
+            <a:r>
               <a:rPr lang="en-US" i="1" dirty="0"/>
-              <a:t> show &lt;message&gt;: </a:t>
-            </a:r>
-            <a:r>
-              <a:rPr lang="en-US" dirty="0"/>
-              <a:t>show the message description</a:t>
-            </a:r>
-            <a:endParaRPr lang="en-US" i="1" dirty="0"/>
-          </a:p>
-          <a:p>
-            <a:r>
-              <a:rPr lang="en-US" i="1" dirty="0" err="1"/>
-              <a:t>rosmsg</a:t>
-            </a:r>
-            <a:r>
-              <a:rPr lang="en-US" i="1" dirty="0"/>
-              <a:t> list: </a:t>
-            </a:r>
-            <a:r>
-              <a:rPr lang="en-US" dirty="0"/>
-              <a:t>list all messages</a:t>
-            </a:r>
-            <a:endParaRPr lang="en-US" i="1" dirty="0"/>
-          </a:p>
-          <a:p>
-            <a:r>
-              <a:rPr lang="en-US" i="1" dirty="0" err="1"/>
-              <a:t>rosmsg</a:t>
-            </a:r>
-            <a:r>
-              <a:rPr lang="en-US" i="1" dirty="0"/>
-              <a:t> md5: </a:t>
-            </a:r>
-            <a:r>
-              <a:rPr lang="en-US" dirty="0"/>
-              <a:t>displays md5sum of a message (checksum to confirm the pub/sub are exchanging the same data type)</a:t>
-            </a:r>
-            <a:endParaRPr lang="en-US" i="1" dirty="0"/>
-          </a:p>
-          <a:p>
-            <a:r>
-              <a:rPr lang="en-US" i="1" dirty="0" err="1"/>
-              <a:t>rosmsg</a:t>
-            </a:r>
-            <a:r>
-              <a:rPr lang="en-US" i="1" dirty="0"/>
-              <a:t> package: </a:t>
-            </a:r>
-            <a:r>
-              <a:rPr lang="en-US" dirty="0"/>
-              <a:t>list the messages in a package</a:t>
-            </a:r>
-            <a:endParaRPr lang="en-US" i="1" dirty="0"/>
-          </a:p>
-          <a:p>
-            <a:r>
-              <a:rPr lang="en-US" i="1" dirty="0" err="1"/>
-              <a:t>rosmsg</a:t>
-            </a:r>
-            <a:r>
-              <a:rPr lang="en-US" i="1" dirty="0"/>
-              <a:t> packages &lt;package_1&gt; &lt;package_2&gt;: </a:t>
+              <a:t>: </a:t>
             </a:r>
             <a:r>
               <a:rPr lang="en-US" dirty="0"/>
@@ -5763,162 +5866,244 @@
         </p:spPr>
         <p:txBody>
           <a:bodyPr>
-            <a:normAutofit lnSpcReduction="10000"/>
+            <a:normAutofit fontScale="92500" lnSpcReduction="10000"/>
           </a:bodyPr>
           <a:lstStyle/>
           <a:p>
             <a:r>
-              <a:rPr lang="en-US" i="1" dirty="0" err="1"/>
+              <a:rPr lang="en-US" sz="1700" dirty="0" err="1">
+                <a:latin typeface="Courier New" panose="02070309020205020404" pitchFamily="49" charset="0"/>
+                <a:cs typeface="Courier New" panose="02070309020205020404" pitchFamily="49" charset="0"/>
+              </a:rPr>
               <a:t>rostopic</a:t>
+            </a:r>
+            <a:r>
+              <a:rPr lang="en-US" sz="1700" dirty="0">
+                <a:latin typeface="Courier New" panose="02070309020205020404" pitchFamily="49" charset="0"/>
+                <a:cs typeface="Courier New" panose="02070309020205020404" pitchFamily="49" charset="0"/>
+              </a:rPr>
+              <a:t> </a:t>
+            </a:r>
+            <a:r>
+              <a:rPr lang="en-US" sz="1700" dirty="0" err="1">
+                <a:latin typeface="Courier New" panose="02070309020205020404" pitchFamily="49" charset="0"/>
+                <a:cs typeface="Courier New" panose="02070309020205020404" pitchFamily="49" charset="0"/>
+              </a:rPr>
+              <a:t>bw</a:t>
+            </a:r>
+            <a:r>
+              <a:rPr lang="en-US" sz="1700" dirty="0">
+                <a:latin typeface="Courier New" panose="02070309020205020404" pitchFamily="49" charset="0"/>
+                <a:cs typeface="Courier New" panose="02070309020205020404" pitchFamily="49" charset="0"/>
+              </a:rPr>
+              <a:t> /topic: </a:t>
+            </a:r>
+            <a:r>
+              <a:rPr lang="en-US" dirty="0"/>
+              <a:t>displays the bandwidth used by a topic</a:t>
+            </a:r>
+            <a:endParaRPr lang="en-US" i="1" dirty="0"/>
+          </a:p>
+          <a:p>
+            <a:r>
+              <a:rPr lang="en-US" sz="1700" dirty="0" err="1">
+                <a:latin typeface="Courier New" panose="02070309020205020404" pitchFamily="49" charset="0"/>
+                <a:cs typeface="Courier New" panose="02070309020205020404" pitchFamily="49" charset="0"/>
+              </a:rPr>
+              <a:t>rostopic</a:t>
+            </a:r>
+            <a:r>
+              <a:rPr lang="en-US" sz="1700" dirty="0">
+                <a:latin typeface="Courier New" panose="02070309020205020404" pitchFamily="49" charset="0"/>
+                <a:cs typeface="Courier New" panose="02070309020205020404" pitchFamily="49" charset="0"/>
+              </a:rPr>
+              <a:t> echo /topic: </a:t>
+            </a:r>
+            <a:r>
+              <a:rPr lang="en-US" dirty="0"/>
+              <a:t>print the content of a given topic in human readable format</a:t>
+            </a:r>
+            <a:endParaRPr lang="en-US" i="1" dirty="0"/>
+          </a:p>
+          <a:p>
+            <a:r>
+              <a:rPr lang="en-US" sz="1700" dirty="0" err="1">
+                <a:latin typeface="Courier New" panose="02070309020205020404" pitchFamily="49" charset="0"/>
+                <a:cs typeface="Courier New" panose="02070309020205020404" pitchFamily="49" charset="0"/>
+              </a:rPr>
+              <a:t>rostopic</a:t>
+            </a:r>
+            <a:r>
+              <a:rPr lang="en-US" sz="1700" dirty="0">
+                <a:latin typeface="Courier New" panose="02070309020205020404" pitchFamily="49" charset="0"/>
+                <a:cs typeface="Courier New" panose="02070309020205020404" pitchFamily="49" charset="0"/>
+              </a:rPr>
+              <a:t> find /</a:t>
+            </a:r>
+            <a:r>
+              <a:rPr lang="en-US" sz="1700" dirty="0" err="1">
+                <a:latin typeface="Courier New" panose="02070309020205020404" pitchFamily="49" charset="0"/>
+                <a:cs typeface="Courier New" panose="02070309020205020404" pitchFamily="49" charset="0"/>
+              </a:rPr>
+              <a:t>message_type</a:t>
+            </a:r>
+            <a:r>
+              <a:rPr lang="en-US" sz="1700" dirty="0">
+                <a:latin typeface="Courier New" panose="02070309020205020404" pitchFamily="49" charset="0"/>
+                <a:cs typeface="Courier New" panose="02070309020205020404" pitchFamily="49" charset="0"/>
+              </a:rPr>
+              <a:t>: </a:t>
+            </a:r>
+            <a:r>
+              <a:rPr lang="en-US" dirty="0"/>
+              <a:t>find topics using the given message type</a:t>
+            </a:r>
+            <a:endParaRPr lang="en-US" i="1" dirty="0"/>
+          </a:p>
+          <a:p>
+            <a:r>
+              <a:rPr lang="en-US" sz="1700" dirty="0" err="1">
+                <a:latin typeface="Courier New" panose="02070309020205020404" pitchFamily="49" charset="0"/>
+                <a:cs typeface="Courier New" panose="02070309020205020404" pitchFamily="49" charset="0"/>
+              </a:rPr>
+              <a:t>rostopic</a:t>
+            </a:r>
+            <a:r>
+              <a:rPr lang="en-US" sz="1700" dirty="0">
+                <a:latin typeface="Courier New" panose="02070309020205020404" pitchFamily="49" charset="0"/>
+                <a:cs typeface="Courier New" panose="02070309020205020404" pitchFamily="49" charset="0"/>
+              </a:rPr>
+              <a:t> </a:t>
+            </a:r>
+            <a:r>
+              <a:rPr lang="en-US" sz="1700" dirty="0" err="1">
+                <a:latin typeface="Courier New" panose="02070309020205020404" pitchFamily="49" charset="0"/>
+                <a:cs typeface="Courier New" panose="02070309020205020404" pitchFamily="49" charset="0"/>
+              </a:rPr>
+              <a:t>hz</a:t>
+            </a:r>
+            <a:r>
+              <a:rPr lang="en-US" sz="1700" dirty="0">
+                <a:latin typeface="Courier New" panose="02070309020205020404" pitchFamily="49" charset="0"/>
+                <a:cs typeface="Courier New" panose="02070309020205020404" pitchFamily="49" charset="0"/>
+              </a:rPr>
+              <a:t> /topic: </a:t>
+            </a:r>
+            <a:r>
+              <a:rPr lang="en-US" dirty="0"/>
+              <a:t>display the publishing rate of the topic</a:t>
+            </a:r>
+            <a:endParaRPr lang="en-US" i="1" dirty="0"/>
+          </a:p>
+          <a:p>
+            <a:r>
+              <a:rPr lang="en-US" sz="1700" dirty="0" err="1">
+                <a:latin typeface="Courier New" panose="02070309020205020404" pitchFamily="49" charset="0"/>
+                <a:cs typeface="Courier New" panose="02070309020205020404" pitchFamily="49" charset="0"/>
+              </a:rPr>
+              <a:t>rostopic</a:t>
+            </a:r>
+            <a:r>
+              <a:rPr lang="en-US" sz="1700" dirty="0">
+                <a:latin typeface="Courier New" panose="02070309020205020404" pitchFamily="49" charset="0"/>
+                <a:cs typeface="Courier New" panose="02070309020205020404" pitchFamily="49" charset="0"/>
+              </a:rPr>
+              <a:t> info /topic: </a:t>
+            </a:r>
+            <a:r>
+              <a:rPr lang="en-US" dirty="0"/>
+              <a:t>print the information about an active topic</a:t>
+            </a:r>
+            <a:endParaRPr lang="en-US" i="1" dirty="0"/>
+          </a:p>
+          <a:p>
+            <a:r>
+              <a:rPr lang="en-US" sz="1700" dirty="0" err="1">
+                <a:latin typeface="Courier New" panose="02070309020205020404" pitchFamily="49" charset="0"/>
+                <a:cs typeface="Courier New" panose="02070309020205020404" pitchFamily="49" charset="0"/>
+              </a:rPr>
+              <a:t>rostopic</a:t>
+            </a:r>
+            <a:r>
+              <a:rPr lang="en-US" sz="1700" dirty="0">
+                <a:latin typeface="Courier New" panose="02070309020205020404" pitchFamily="49" charset="0"/>
+                <a:cs typeface="Courier New" panose="02070309020205020404" pitchFamily="49" charset="0"/>
+              </a:rPr>
+              <a:t> list: </a:t>
+            </a:r>
+            <a:r>
+              <a:rPr lang="en-US" dirty="0"/>
+              <a:t>list all active topics</a:t>
+            </a:r>
+            <a:endParaRPr lang="en-US" i="1" dirty="0"/>
+          </a:p>
+          <a:p>
+            <a:r>
+              <a:rPr lang="en-US" sz="1700" dirty="0" err="1">
+                <a:latin typeface="Courier New" panose="02070309020205020404" pitchFamily="49" charset="0"/>
+                <a:cs typeface="Courier New" panose="02070309020205020404" pitchFamily="49" charset="0"/>
+              </a:rPr>
+              <a:t>rostopic</a:t>
+            </a:r>
+            <a:r>
+              <a:rPr lang="en-US" sz="1700" dirty="0">
+                <a:latin typeface="Courier New" panose="02070309020205020404" pitchFamily="49" charset="0"/>
+                <a:cs typeface="Courier New" panose="02070309020205020404" pitchFamily="49" charset="0"/>
+              </a:rPr>
+              <a:t> pub /topic </a:t>
+            </a:r>
+            <a:r>
+              <a:rPr lang="en-US" sz="1700" dirty="0" err="1">
+                <a:latin typeface="Courier New" panose="02070309020205020404" pitchFamily="49" charset="0"/>
+                <a:cs typeface="Courier New" panose="02070309020205020404" pitchFamily="49" charset="0"/>
+              </a:rPr>
+              <a:t>message_type</a:t>
+            </a:r>
+            <a:r>
+              <a:rPr lang="en-US" sz="1700" dirty="0">
+                <a:latin typeface="Courier New" panose="02070309020205020404" pitchFamily="49" charset="0"/>
+                <a:cs typeface="Courier New" panose="02070309020205020404" pitchFamily="49" charset="0"/>
+              </a:rPr>
+              <a:t> </a:t>
+            </a:r>
+            <a:r>
+              <a:rPr lang="en-US" sz="1700" dirty="0" err="1">
+                <a:latin typeface="Courier New" panose="02070309020205020404" pitchFamily="49" charset="0"/>
+                <a:cs typeface="Courier New" panose="02070309020205020404" pitchFamily="49" charset="0"/>
+              </a:rPr>
+              <a:t>args</a:t>
+            </a:r>
+            <a:r>
+              <a:rPr lang="en-US" sz="1700" dirty="0">
+                <a:latin typeface="Courier New" panose="02070309020205020404" pitchFamily="49" charset="0"/>
+                <a:cs typeface="Courier New" panose="02070309020205020404" pitchFamily="49" charset="0"/>
+              </a:rPr>
+              <a:t>: </a:t>
+            </a:r>
+            <a:r>
+              <a:rPr lang="en-US" dirty="0"/>
+              <a:t>publish a value to a topic with the message type</a:t>
+            </a:r>
+            <a:endParaRPr lang="en-US" i="1" dirty="0"/>
+          </a:p>
+          <a:p>
+            <a:r>
+              <a:rPr lang="en-US" sz="1700" dirty="0" err="1">
+                <a:latin typeface="Courier New" panose="02070309020205020404" pitchFamily="49" charset="0"/>
+                <a:cs typeface="Courier New" panose="02070309020205020404" pitchFamily="49" charset="0"/>
+              </a:rPr>
+              <a:t>rostopic</a:t>
+            </a:r>
+            <a:r>
+              <a:rPr lang="en-US" sz="1700" dirty="0">
+                <a:latin typeface="Courier New" panose="02070309020205020404" pitchFamily="49" charset="0"/>
+                <a:cs typeface="Courier New" panose="02070309020205020404" pitchFamily="49" charset="0"/>
+              </a:rPr>
+              <a:t> type /topic:</a:t>
             </a:r>
             <a:r>
               <a:rPr lang="en-US" i="1" dirty="0"/>
               <a:t> </a:t>
-            </a:r>
-            <a:r>
-              <a:rPr lang="en-US" i="1" dirty="0" err="1"/>
-              <a:t>bw</a:t>
-            </a:r>
-            <a:r>
-              <a:rPr lang="en-US" i="1" dirty="0"/>
-              <a:t> /topic: </a:t>
-            </a:r>
-            <a:r>
-              <a:rPr lang="en-US" dirty="0"/>
-              <a:t>displays the bandwidth used by a topic</a:t>
-            </a:r>
-            <a:endParaRPr lang="en-US" i="1" dirty="0"/>
-          </a:p>
-          <a:p>
-            <a:r>
-              <a:rPr lang="en-US" i="1" dirty="0" err="1"/>
-              <a:t>rostopic</a:t>
-            </a:r>
-            <a:r>
-              <a:rPr lang="en-US" i="1" dirty="0"/>
-              <a:t> echo /topic: </a:t>
-            </a:r>
-            <a:r>
-              <a:rPr lang="en-US" dirty="0"/>
-              <a:t>print the content of a given topic in human readable format</a:t>
-            </a:r>
-            <a:endParaRPr lang="en-US" i="1" dirty="0"/>
-          </a:p>
-          <a:p>
-            <a:r>
-              <a:rPr lang="en-US" i="1" dirty="0" err="1"/>
-              <a:t>rostopic</a:t>
-            </a:r>
-            <a:r>
-              <a:rPr lang="en-US" i="1" dirty="0"/>
-              <a:t> find /</a:t>
-            </a:r>
-            <a:r>
-              <a:rPr lang="en-US" i="1" dirty="0" err="1"/>
-              <a:t>message_type</a:t>
-            </a:r>
-            <a:r>
-              <a:rPr lang="en-US" i="1" dirty="0"/>
-              <a:t>; </a:t>
-            </a:r>
-            <a:r>
-              <a:rPr lang="en-US" dirty="0"/>
-              <a:t>find topics using the given message type</a:t>
-            </a:r>
-            <a:endParaRPr lang="en-US" i="1" dirty="0"/>
-          </a:p>
-          <a:p>
-            <a:r>
-              <a:rPr lang="en-US" i="1" dirty="0" err="1"/>
-              <a:t>rostopic</a:t>
-            </a:r>
-            <a:r>
-              <a:rPr lang="en-US" i="1" dirty="0"/>
-              <a:t> </a:t>
-            </a:r>
-            <a:r>
-              <a:rPr lang="en-US" i="1" dirty="0" err="1"/>
-              <a:t>hz</a:t>
-            </a:r>
-            <a:r>
-              <a:rPr lang="en-US" i="1" dirty="0"/>
-              <a:t> /topic: </a:t>
-            </a:r>
-            <a:r>
-              <a:rPr lang="en-US" dirty="0"/>
-              <a:t>display the publishing rate of the topic</a:t>
-            </a:r>
-            <a:endParaRPr lang="en-US" i="1" dirty="0"/>
-          </a:p>
-          <a:p>
-            <a:r>
-              <a:rPr lang="en-US" i="1" dirty="0" err="1"/>
-              <a:t>rostopic</a:t>
-            </a:r>
-            <a:r>
-              <a:rPr lang="en-US" i="1" dirty="0"/>
-              <a:t> info /topic: </a:t>
-            </a:r>
-            <a:r>
-              <a:rPr lang="en-US" dirty="0"/>
-              <a:t>print the information about an active topic</a:t>
-            </a:r>
-            <a:endParaRPr lang="en-US" i="1" dirty="0"/>
-          </a:p>
-          <a:p>
-            <a:r>
-              <a:rPr lang="en-US" i="1" dirty="0" err="1"/>
-              <a:t>rostopic</a:t>
-            </a:r>
-            <a:r>
-              <a:rPr lang="en-US" i="1" dirty="0"/>
-              <a:t> list: </a:t>
-            </a:r>
-            <a:r>
-              <a:rPr lang="en-US" dirty="0"/>
-              <a:t>list all active topics</a:t>
-            </a:r>
-            <a:endParaRPr lang="en-US" i="1" dirty="0"/>
-          </a:p>
-          <a:p>
-            <a:r>
-              <a:rPr lang="en-US" i="1" dirty="0" err="1"/>
-              <a:t>rostopic</a:t>
-            </a:r>
-            <a:r>
-              <a:rPr lang="en-US" i="1" dirty="0"/>
-              <a:t> pub /topic </a:t>
-            </a:r>
-            <a:r>
-              <a:rPr lang="en-US" i="1" dirty="0" err="1"/>
-              <a:t>message_type</a:t>
-            </a:r>
-            <a:r>
-              <a:rPr lang="en-US" i="1" dirty="0"/>
-              <a:t> </a:t>
-            </a:r>
-            <a:r>
-              <a:rPr lang="en-US" i="1" dirty="0" err="1"/>
-              <a:t>args</a:t>
-            </a:r>
-            <a:r>
-              <a:rPr lang="en-US" i="1" dirty="0"/>
-              <a:t>: </a:t>
-            </a:r>
-            <a:r>
-              <a:rPr lang="en-US" dirty="0"/>
-              <a:t>publish a value to a topic with the message type</a:t>
-            </a:r>
-            <a:endParaRPr lang="en-US" i="1" dirty="0"/>
-          </a:p>
-          <a:p>
-            <a:r>
-              <a:rPr lang="en-US" i="1" dirty="0" err="1"/>
-              <a:t>rostopic</a:t>
-            </a:r>
-            <a:r>
-              <a:rPr lang="en-US" i="1" dirty="0"/>
-              <a:t> type /topic: </a:t>
             </a:r>
             <a:r>
               <a:rPr lang="en-US" dirty="0"/>
@@ -6166,19 +6351,31 @@
           <a:lstStyle/>
           <a:p>
             <a:r>
-              <a:rPr lang="en-US" i="1" dirty="0" err="1"/>
+              <a:rPr lang="en-US" sz="1600" dirty="0" err="1">
+                <a:latin typeface="Courier New" panose="02070309020205020404" pitchFamily="49" charset="0"/>
+                <a:cs typeface="Courier New" panose="02070309020205020404" pitchFamily="49" charset="0"/>
+              </a:rPr>
               <a:t>rosservice</a:t>
             </a:r>
             <a:r>
-              <a:rPr lang="en-US" i="1" dirty="0"/>
+              <a:rPr lang="en-US" sz="1600" dirty="0">
+                <a:latin typeface="Courier New" panose="02070309020205020404" pitchFamily="49" charset="0"/>
+                <a:cs typeface="Courier New" panose="02070309020205020404" pitchFamily="49" charset="0"/>
+              </a:rPr>
               <a:t> call /service </a:t>
             </a:r>
             <a:r>
-              <a:rPr lang="en-US" i="1" dirty="0" err="1"/>
+              <a:rPr lang="en-US" sz="1600" dirty="0" err="1">
+                <a:latin typeface="Courier New" panose="02070309020205020404" pitchFamily="49" charset="0"/>
+                <a:cs typeface="Courier New" panose="02070309020205020404" pitchFamily="49" charset="0"/>
+              </a:rPr>
               <a:t>args</a:t>
             </a:r>
             <a:r>
-              <a:rPr lang="en-US" i="1" dirty="0"/>
+              <a:rPr lang="en-US" sz="1600" dirty="0">
+                <a:latin typeface="Courier New" panose="02070309020205020404" pitchFamily="49" charset="0"/>
+                <a:cs typeface="Courier New" panose="02070309020205020404" pitchFamily="49" charset="0"/>
+              </a:rPr>
               <a:t>: </a:t>
             </a:r>
             <a:r>
@@ -6189,19 +6386,31 @@
           </a:p>
           <a:p>
             <a:r>
-              <a:rPr lang="en-US" i="1" dirty="0" err="1"/>
+              <a:rPr lang="en-US" sz="1600" dirty="0" err="1">
+                <a:latin typeface="Courier New" panose="02070309020205020404" pitchFamily="49" charset="0"/>
+                <a:cs typeface="Courier New" panose="02070309020205020404" pitchFamily="49" charset="0"/>
+              </a:rPr>
               <a:t>rosservice</a:t>
             </a:r>
             <a:r>
-              <a:rPr lang="en-US" i="1" dirty="0"/>
+              <a:rPr lang="en-US" sz="1600" dirty="0">
+                <a:latin typeface="Courier New" panose="02070309020205020404" pitchFamily="49" charset="0"/>
+                <a:cs typeface="Courier New" panose="02070309020205020404" pitchFamily="49" charset="0"/>
+              </a:rPr>
               <a:t> find </a:t>
             </a:r>
             <a:r>
-              <a:rPr lang="en-US" i="1" dirty="0" err="1"/>
+              <a:rPr lang="en-US" sz="1600" dirty="0" err="1">
+                <a:latin typeface="Courier New" panose="02070309020205020404" pitchFamily="49" charset="0"/>
+                <a:cs typeface="Courier New" panose="02070309020205020404" pitchFamily="49" charset="0"/>
+              </a:rPr>
               <a:t>service_type</a:t>
             </a:r>
             <a:r>
-              <a:rPr lang="en-US" i="1" dirty="0"/>
+              <a:rPr lang="en-US" sz="1600" dirty="0">
+                <a:latin typeface="Courier New" panose="02070309020205020404" pitchFamily="49" charset="0"/>
+                <a:cs typeface="Courier New" panose="02070309020205020404" pitchFamily="49" charset="0"/>
+              </a:rPr>
               <a:t>: </a:t>
             </a:r>
             <a:r>
@@ -6212,11 +6421,17 @@
           </a:p>
           <a:p>
             <a:r>
-              <a:rPr lang="en-US" i="1" dirty="0" err="1"/>
+              <a:rPr lang="en-US" sz="1600" dirty="0" err="1">
+                <a:latin typeface="Courier New" panose="02070309020205020404" pitchFamily="49" charset="0"/>
+                <a:cs typeface="Courier New" panose="02070309020205020404" pitchFamily="49" charset="0"/>
+              </a:rPr>
               <a:t>rosservice</a:t>
             </a:r>
             <a:r>
-              <a:rPr lang="en-US" i="1" dirty="0"/>
+              <a:rPr lang="en-US" sz="1600" dirty="0">
+                <a:latin typeface="Courier New" panose="02070309020205020404" pitchFamily="49" charset="0"/>
+                <a:cs typeface="Courier New" panose="02070309020205020404" pitchFamily="49" charset="0"/>
+              </a:rPr>
               <a:t> info /services: </a:t>
             </a:r>
             <a:r>
@@ -6227,11 +6442,17 @@
           </a:p>
           <a:p>
             <a:r>
-              <a:rPr lang="en-US" i="1" dirty="0" err="1"/>
+              <a:rPr lang="en-US" sz="1600" dirty="0" err="1">
+                <a:latin typeface="Courier New" panose="02070309020205020404" pitchFamily="49" charset="0"/>
+                <a:cs typeface="Courier New" panose="02070309020205020404" pitchFamily="49" charset="0"/>
+              </a:rPr>
               <a:t>rosservice</a:t>
             </a:r>
             <a:r>
-              <a:rPr lang="en-US" i="1" dirty="0"/>
+              <a:rPr lang="en-US" sz="1600" dirty="0">
+                <a:latin typeface="Courier New" panose="02070309020205020404" pitchFamily="49" charset="0"/>
+                <a:cs typeface="Courier New" panose="02070309020205020404" pitchFamily="49" charset="0"/>
+              </a:rPr>
               <a:t> list: </a:t>
             </a:r>
             <a:r>
@@ -6242,11 +6463,17 @@
           </a:p>
           <a:p>
             <a:r>
-              <a:rPr lang="en-US" i="1" dirty="0" err="1"/>
+              <a:rPr lang="en-US" sz="1600" dirty="0" err="1">
+                <a:latin typeface="Courier New" panose="02070309020205020404" pitchFamily="49" charset="0"/>
+                <a:cs typeface="Courier New" panose="02070309020205020404" pitchFamily="49" charset="0"/>
+              </a:rPr>
               <a:t>rosservice</a:t>
             </a:r>
             <a:r>
-              <a:rPr lang="en-US" i="1" dirty="0"/>
+              <a:rPr lang="en-US" sz="1600" dirty="0">
+                <a:latin typeface="Courier New" panose="02070309020205020404" pitchFamily="49" charset="0"/>
+                <a:cs typeface="Courier New" panose="02070309020205020404" pitchFamily="49" charset="0"/>
+              </a:rPr>
               <a:t> type /service: </a:t>
             </a:r>
             <a:r>
@@ -6337,41 +6564,65 @@
           <a:lstStyle/>
           <a:p>
             <a:r>
-              <a:rPr lang="en-US" i="1" dirty="0" err="1"/>
+              <a:rPr lang="en-US" sz="1600" dirty="0" err="1">
+                <a:latin typeface="Courier New" panose="02070309020205020404" pitchFamily="49" charset="0"/>
+                <a:cs typeface="Courier New" panose="02070309020205020404" pitchFamily="49" charset="0"/>
+              </a:rPr>
               <a:t>rosbag</a:t>
             </a:r>
             <a:r>
-              <a:rPr lang="en-US" i="1" dirty="0"/>
+              <a:rPr lang="en-US" sz="1600" dirty="0">
+                <a:latin typeface="Courier New" panose="02070309020205020404" pitchFamily="49" charset="0"/>
+                <a:cs typeface="Courier New" panose="02070309020205020404" pitchFamily="49" charset="0"/>
+              </a:rPr>
               <a:t> record &lt;topic_1&gt; &lt;topic_2&gt; -o &lt;</a:t>
             </a:r>
             <a:r>
-              <a:rPr lang="en-US" i="1" dirty="0" err="1"/>
+              <a:rPr lang="en-US" sz="1600" dirty="0" err="1">
+                <a:latin typeface="Courier New" panose="02070309020205020404" pitchFamily="49" charset="0"/>
+                <a:cs typeface="Courier New" panose="02070309020205020404" pitchFamily="49" charset="0"/>
+              </a:rPr>
               <a:t>bag_name</a:t>
             </a:r>
             <a:r>
-              <a:rPr lang="en-US" i="1" dirty="0"/>
-              <a:t>&gt;</a:t>
-            </a:r>
-            <a:r>
-              <a:rPr lang="en-US" dirty="0"/>
-              <a:t>:  record the given topics into a bag file with the given name</a:t>
-            </a:r>
-          </a:p>
-          <a:p>
-            <a:r>
-              <a:rPr lang="en-US" i="1" dirty="0" err="1"/>
+              <a:rPr lang="en-US" sz="1600" dirty="0">
+                <a:latin typeface="Courier New" panose="02070309020205020404" pitchFamily="49" charset="0"/>
+                <a:cs typeface="Courier New" panose="02070309020205020404" pitchFamily="49" charset="0"/>
+              </a:rPr>
+              <a:t>&gt;:  </a:t>
+            </a:r>
+            <a:r>
+              <a:rPr lang="en-US" dirty="0"/>
+              <a:t>record the given topics into a bag file with the given name</a:t>
+            </a:r>
+          </a:p>
+          <a:p>
+            <a:r>
+              <a:rPr lang="en-US" sz="1600" dirty="0" err="1">
+                <a:latin typeface="Courier New" panose="02070309020205020404" pitchFamily="49" charset="0"/>
+                <a:cs typeface="Courier New" panose="02070309020205020404" pitchFamily="49" charset="0"/>
+              </a:rPr>
               <a:t>rosbag</a:t>
             </a:r>
             <a:r>
-              <a:rPr lang="en-US" i="1" dirty="0"/>
+              <a:rPr lang="en-US" sz="1600" dirty="0">
+                <a:latin typeface="Courier New" panose="02070309020205020404" pitchFamily="49" charset="0"/>
+                <a:cs typeface="Courier New" panose="02070309020205020404" pitchFamily="49" charset="0"/>
+              </a:rPr>
               <a:t> play &lt;</a:t>
             </a:r>
             <a:r>
-              <a:rPr lang="en-US" i="1" dirty="0" err="1"/>
+              <a:rPr lang="en-US" sz="1600" dirty="0" err="1">
+                <a:latin typeface="Courier New" panose="02070309020205020404" pitchFamily="49" charset="0"/>
+                <a:cs typeface="Courier New" panose="02070309020205020404" pitchFamily="49" charset="0"/>
+              </a:rPr>
               <a:t>bag_name</a:t>
             </a:r>
             <a:r>
-              <a:rPr lang="en-US" i="1" dirty="0"/>
+              <a:rPr lang="en-US" sz="1600" dirty="0">
+                <a:latin typeface="Courier New" panose="02070309020205020404" pitchFamily="49" charset="0"/>
+                <a:cs typeface="Courier New" panose="02070309020205020404" pitchFamily="49" charset="0"/>
+              </a:rPr>
               <a:t>&gt;: </a:t>
             </a:r>
             <a:r>
@@ -6469,11 +6720,17 @@
           <a:lstStyle/>
           <a:p>
             <a:r>
-              <a:rPr lang="en-US" i="1" dirty="0" err="1"/>
+              <a:rPr lang="en-US" sz="1600" dirty="0" err="1">
+                <a:latin typeface="Courier New" panose="02070309020205020404" pitchFamily="49" charset="0"/>
+                <a:cs typeface="Courier New" panose="02070309020205020404" pitchFamily="49" charset="0"/>
+              </a:rPr>
               <a:t>rosparam</a:t>
             </a:r>
             <a:r>
-              <a:rPr lang="en-US" i="1" dirty="0"/>
+              <a:rPr lang="en-US" sz="1600" dirty="0">
+                <a:latin typeface="Courier New" panose="02070309020205020404" pitchFamily="49" charset="0"/>
+                <a:cs typeface="Courier New" panose="02070309020205020404" pitchFamily="49" charset="0"/>
+              </a:rPr>
               <a:t> list: </a:t>
             </a:r>
             <a:r>
@@ -6484,19 +6741,31 @@
           </a:p>
           <a:p>
             <a:r>
-              <a:rPr lang="en-US" i="1" dirty="0" err="1"/>
+              <a:rPr lang="en-US" sz="1600" dirty="0" err="1">
+                <a:latin typeface="Courier New" panose="02070309020205020404" pitchFamily="49" charset="0"/>
+                <a:cs typeface="Courier New" panose="02070309020205020404" pitchFamily="49" charset="0"/>
+              </a:rPr>
               <a:t>rosparam</a:t>
             </a:r>
             <a:r>
-              <a:rPr lang="en-US" i="1" dirty="0"/>
+              <a:rPr lang="en-US" sz="1600" dirty="0">
+                <a:latin typeface="Courier New" panose="02070309020205020404" pitchFamily="49" charset="0"/>
+                <a:cs typeface="Courier New" panose="02070309020205020404" pitchFamily="49" charset="0"/>
+              </a:rPr>
               <a:t> set &lt;</a:t>
             </a:r>
             <a:r>
-              <a:rPr lang="en-US" i="1" dirty="0" err="1"/>
+              <a:rPr lang="en-US" sz="1600" dirty="0" err="1">
+                <a:latin typeface="Courier New" panose="02070309020205020404" pitchFamily="49" charset="0"/>
+                <a:cs typeface="Courier New" panose="02070309020205020404" pitchFamily="49" charset="0"/>
+              </a:rPr>
               <a:t>param_name</a:t>
             </a:r>
             <a:r>
-              <a:rPr lang="en-US" i="1" dirty="0"/>
+              <a:rPr lang="en-US" sz="1600" dirty="0">
+                <a:latin typeface="Courier New" panose="02070309020205020404" pitchFamily="49" charset="0"/>
+                <a:cs typeface="Courier New" panose="02070309020205020404" pitchFamily="49" charset="0"/>
+              </a:rPr>
               <a:t>&gt; &lt;value&gt;: </a:t>
             </a:r>
             <a:r>
@@ -6507,19 +6776,31 @@
           </a:p>
           <a:p>
             <a:r>
-              <a:rPr lang="en-US" i="1" dirty="0" err="1"/>
+              <a:rPr lang="en-US" sz="1600" dirty="0" err="1">
+                <a:latin typeface="Courier New" panose="02070309020205020404" pitchFamily="49" charset="0"/>
+                <a:cs typeface="Courier New" panose="02070309020205020404" pitchFamily="49" charset="0"/>
+              </a:rPr>
               <a:t>rosparam</a:t>
             </a:r>
             <a:r>
-              <a:rPr lang="en-US" i="1" dirty="0"/>
+              <a:rPr lang="en-US" sz="1600" dirty="0">
+                <a:latin typeface="Courier New" panose="02070309020205020404" pitchFamily="49" charset="0"/>
+                <a:cs typeface="Courier New" panose="02070309020205020404" pitchFamily="49" charset="0"/>
+              </a:rPr>
               <a:t> get &lt;</a:t>
             </a:r>
             <a:r>
-              <a:rPr lang="en-US" i="1" dirty="0" err="1"/>
+              <a:rPr lang="en-US" sz="1600" dirty="0" err="1">
+                <a:latin typeface="Courier New" panose="02070309020205020404" pitchFamily="49" charset="0"/>
+                <a:cs typeface="Courier New" panose="02070309020205020404" pitchFamily="49" charset="0"/>
+              </a:rPr>
               <a:t>param_name</a:t>
             </a:r>
             <a:r>
-              <a:rPr lang="en-US" i="1" dirty="0"/>
+              <a:rPr lang="en-US" sz="1600" dirty="0">
+                <a:latin typeface="Courier New" panose="02070309020205020404" pitchFamily="49" charset="0"/>
+                <a:cs typeface="Courier New" panose="02070309020205020404" pitchFamily="49" charset="0"/>
+              </a:rPr>
               <a:t>&gt;: </a:t>
             </a:r>
             <a:r>
@@ -6530,19 +6811,31 @@
           </a:p>
           <a:p>
             <a:r>
-              <a:rPr lang="en-US" i="1" dirty="0" err="1"/>
+              <a:rPr lang="en-US" sz="1600" dirty="0" err="1">
+                <a:latin typeface="Courier New" panose="02070309020205020404" pitchFamily="49" charset="0"/>
+                <a:cs typeface="Courier New" panose="02070309020205020404" pitchFamily="49" charset="0"/>
+              </a:rPr>
               <a:t>rosparam</a:t>
             </a:r>
             <a:r>
-              <a:rPr lang="en-US" i="1" dirty="0"/>
+              <a:rPr lang="en-US" sz="1600" dirty="0">
+                <a:latin typeface="Courier New" panose="02070309020205020404" pitchFamily="49" charset="0"/>
+                <a:cs typeface="Courier New" panose="02070309020205020404" pitchFamily="49" charset="0"/>
+              </a:rPr>
               <a:t> load &lt;.</a:t>
             </a:r>
             <a:r>
-              <a:rPr lang="en-US" i="1" dirty="0" err="1"/>
+              <a:rPr lang="en-US" sz="1600" dirty="0" err="1">
+                <a:latin typeface="Courier New" panose="02070309020205020404" pitchFamily="49" charset="0"/>
+                <a:cs typeface="Courier New" panose="02070309020205020404" pitchFamily="49" charset="0"/>
+              </a:rPr>
               <a:t>yaml_file</a:t>
             </a:r>
             <a:r>
-              <a:rPr lang="en-US" i="1" dirty="0"/>
+              <a:rPr lang="en-US" sz="1600" dirty="0">
+                <a:latin typeface="Courier New" panose="02070309020205020404" pitchFamily="49" charset="0"/>
+                <a:cs typeface="Courier New" panose="02070309020205020404" pitchFamily="49" charset="0"/>
+              </a:rPr>
               <a:t>&gt;: </a:t>
             </a:r>
             <a:r>
@@ -6561,20 +6854,36 @@
           </a:p>
           <a:p>
             <a:r>
-              <a:rPr lang="en-US" i="1" dirty="0" err="1"/>
+              <a:rPr lang="en-US" sz="1600" dirty="0" err="1">
+                <a:latin typeface="Courier New" panose="02070309020205020404" pitchFamily="49" charset="0"/>
+                <a:cs typeface="Courier New" panose="02070309020205020404" pitchFamily="49" charset="0"/>
+              </a:rPr>
               <a:t>rosparam</a:t>
             </a:r>
             <a:r>
+              <a:rPr lang="en-US" sz="1600" dirty="0">
+                <a:latin typeface="Courier New" panose="02070309020205020404" pitchFamily="49" charset="0"/>
+                <a:cs typeface="Courier New" panose="02070309020205020404" pitchFamily="49" charset="0"/>
+              </a:rPr>
+              <a:t> dump &lt;.</a:t>
+            </a:r>
+            <a:r>
+              <a:rPr lang="en-US" sz="1600" dirty="0" err="1">
+                <a:latin typeface="Courier New" panose="02070309020205020404" pitchFamily="49" charset="0"/>
+                <a:cs typeface="Courier New" panose="02070309020205020404" pitchFamily="49" charset="0"/>
+              </a:rPr>
+              <a:t>yaml</a:t>
+            </a:r>
+            <a:r>
+              <a:rPr lang="en-US" sz="1600" dirty="0">
+                <a:latin typeface="Courier New" panose="02070309020205020404" pitchFamily="49" charset="0"/>
+                <a:cs typeface="Courier New" panose="02070309020205020404" pitchFamily="49" charset="0"/>
+              </a:rPr>
+              <a:t> file&gt;:</a:t>
+            </a:r>
+            <a:r>
               <a:rPr lang="en-US" i="1" dirty="0"/>
-              <a:t> dump &lt;.</a:t>
-            </a:r>
-            <a:r>
-              <a:rPr lang="en-US" i="1" dirty="0" err="1"/>
-              <a:t>yaml</a:t>
-            </a:r>
-            <a:r>
-              <a:rPr lang="en-US" i="1" dirty="0"/>
-              <a:t> file&gt;: </a:t>
+              <a:t> </a:t>
             </a:r>
             <a:r>
               <a:rPr lang="en-US" dirty="0"/>
@@ -6592,19 +6901,31 @@
           </a:p>
           <a:p>
             <a:r>
-              <a:rPr lang="en-US" i="1" dirty="0" err="1"/>
+              <a:rPr lang="en-US" sz="1600" dirty="0" err="1">
+                <a:latin typeface="Courier New" panose="02070309020205020404" pitchFamily="49" charset="0"/>
+                <a:cs typeface="Courier New" panose="02070309020205020404" pitchFamily="49" charset="0"/>
+              </a:rPr>
               <a:t>rosparam</a:t>
             </a:r>
             <a:r>
-              <a:rPr lang="en-US" i="1" dirty="0"/>
+              <a:rPr lang="en-US" sz="1600" dirty="0">
+                <a:latin typeface="Courier New" panose="02070309020205020404" pitchFamily="49" charset="0"/>
+                <a:cs typeface="Courier New" panose="02070309020205020404" pitchFamily="49" charset="0"/>
+              </a:rPr>
               <a:t> delete &lt;</a:t>
             </a:r>
             <a:r>
-              <a:rPr lang="en-US" i="1" dirty="0" err="1"/>
+              <a:rPr lang="en-US" sz="1600" dirty="0" err="1">
+                <a:latin typeface="Courier New" panose="02070309020205020404" pitchFamily="49" charset="0"/>
+                <a:cs typeface="Courier New" panose="02070309020205020404" pitchFamily="49" charset="0"/>
+              </a:rPr>
               <a:t>parameter_name</a:t>
             </a:r>
             <a:r>
-              <a:rPr lang="en-US" i="1" dirty="0"/>
+              <a:rPr lang="en-US" sz="1600" dirty="0">
+                <a:latin typeface="Courier New" panose="02070309020205020404" pitchFamily="49" charset="0"/>
+                <a:cs typeface="Courier New" panose="02070309020205020404" pitchFamily="49" charset="0"/>
+              </a:rPr>
               <a:t>&gt;: </a:t>
             </a:r>
             <a:r>

</xml_diff>

<commit_message>
Update the introduction file
</commit_message>
<xml_diff>
--- a/DiRa_Digital_Race_Software/Reference/ROS/Introduction to ROS.pptx
+++ b/DiRa_Digital_Race_Software/Reference/ROS/Introduction to ROS.pptx
@@ -4835,8 +4835,15 @@
           <a:p>
             <a:r>
               <a:rPr lang="en-US" dirty="0"/>
-              <a:t>*Note: this part requires a full installation of ROS. Please install ROS and setup the workspace according to the provided tutorial.</a:t>
-            </a:r>
+              <a:t>*Note: this part requires a full installation of ROS. Please install ROS and setup the workspace according to the </a:t>
+            </a:r>
+            <a:r>
+              <a:rPr lang="en-US" dirty="0">
+                <a:hlinkClick r:id="rId2" action="ppaction://hlinkfile"/>
+              </a:rPr>
+              <a:t>provided tutorial.</a:t>
+            </a:r>
+            <a:endParaRPr lang="en-US" dirty="0"/>
           </a:p>
         </p:txBody>
       </p:sp>

</xml_diff>